<commit_message>
update readme & add structure img
</commit_message>
<xml_diff>
--- a/assets/structure.pptx
+++ b/assets/structure.pptx
@@ -104,6 +104,11 @@
       </a:defRPr>
     </a:lvl9pPr>
   </p:defaultTextStyle>
+  <p:extLst>
+    <p:ext uri="{EFAFB233-063F-42B5-8137-9DF3F51BA10A}">
+      <p15:sldGuideLst xmlns:p15="http://schemas.microsoft.com/office/powerpoint/2012/main"/>
+    </p:ext>
+  </p:extLst>
 </p:presentation>
 </file>
 
@@ -3580,13 +3585,11 @@
           <a:prstGeom prst="straightConnector1">
             <a:avLst/>
           </a:prstGeom>
-          <a:ln w="12700">
+          <a:ln w="19050">
             <a:solidFill>
-              <a:schemeClr val="accent2">
-                <a:lumMod val="75000"/>
-              </a:schemeClr>
+              <a:schemeClr val="accent2"/>
             </a:solidFill>
-            <a:prstDash val="dash"/>
+            <a:prstDash val="sysDash"/>
             <a:tailEnd type="triangle"/>
           </a:ln>
         </p:spPr>
@@ -3892,25 +3895,24 @@
           </p:cNvPr>
           <p:cNvCxnSpPr>
             <a:cxnSpLocks/>
+            <a:stCxn id="7" idx="3"/>
             <a:endCxn id="12" idx="1"/>
           </p:cNvCxnSpPr>
           <p:nvPr/>
         </p:nvCxnSpPr>
         <p:spPr>
           <a:xfrm flipV="1">
-            <a:off x="2971937" y="2157168"/>
-            <a:ext cx="718314" cy="1017515"/>
+            <a:off x="3070240" y="2157168"/>
+            <a:ext cx="620011" cy="1017515"/>
           </a:xfrm>
           <a:prstGeom prst="straightConnector1">
             <a:avLst/>
           </a:prstGeom>
-          <a:ln w="12700">
+          <a:ln w="19050">
             <a:solidFill>
-              <a:schemeClr val="accent2">
-                <a:lumMod val="75000"/>
-              </a:schemeClr>
+              <a:schemeClr val="accent2"/>
             </a:solidFill>
-            <a:prstDash val="dash"/>
+            <a:prstDash val="sysDash"/>
             <a:tailEnd type="triangle"/>
           </a:ln>
         </p:spPr>
@@ -3940,25 +3942,24 @@
           </p:cNvPr>
           <p:cNvCxnSpPr>
             <a:cxnSpLocks/>
+            <a:stCxn id="7" idx="3"/>
             <a:endCxn id="13" idx="1"/>
           </p:cNvCxnSpPr>
           <p:nvPr/>
         </p:nvCxnSpPr>
         <p:spPr>
           <a:xfrm flipV="1">
-            <a:off x="2971937" y="2881880"/>
-            <a:ext cx="718314" cy="292803"/>
+            <a:off x="3070240" y="2881880"/>
+            <a:ext cx="620011" cy="292803"/>
           </a:xfrm>
           <a:prstGeom prst="straightConnector1">
             <a:avLst/>
           </a:prstGeom>
-          <a:ln w="12700">
+          <a:ln w="19050">
             <a:solidFill>
-              <a:schemeClr val="accent2">
-                <a:lumMod val="75000"/>
-              </a:schemeClr>
+              <a:schemeClr val="accent2"/>
             </a:solidFill>
-            <a:prstDash val="dash"/>
+            <a:prstDash val="sysDash"/>
             <a:tailEnd type="triangle"/>
           </a:ln>
         </p:spPr>
@@ -3988,25 +3989,24 @@
           </p:cNvPr>
           <p:cNvCxnSpPr>
             <a:cxnSpLocks/>
+            <a:stCxn id="7" idx="3"/>
             <a:endCxn id="14" idx="1"/>
           </p:cNvCxnSpPr>
           <p:nvPr/>
         </p:nvCxnSpPr>
         <p:spPr>
           <a:xfrm>
-            <a:off x="2971937" y="3174683"/>
-            <a:ext cx="718313" cy="431909"/>
+            <a:off x="3070240" y="3174683"/>
+            <a:ext cx="620010" cy="431909"/>
           </a:xfrm>
           <a:prstGeom prst="straightConnector1">
             <a:avLst/>
           </a:prstGeom>
-          <a:ln w="12700">
+          <a:ln w="19050">
             <a:solidFill>
-              <a:schemeClr val="accent2">
-                <a:lumMod val="75000"/>
-              </a:schemeClr>
+              <a:schemeClr val="accent2"/>
             </a:solidFill>
-            <a:prstDash val="dash"/>
+            <a:prstDash val="sysDash"/>
             <a:tailEnd type="triangle"/>
           </a:ln>
         </p:spPr>
@@ -4036,25 +4036,24 @@
           </p:cNvPr>
           <p:cNvCxnSpPr>
             <a:cxnSpLocks/>
+            <a:stCxn id="7" idx="3"/>
             <a:endCxn id="15" idx="1"/>
           </p:cNvCxnSpPr>
           <p:nvPr/>
         </p:nvCxnSpPr>
         <p:spPr>
           <a:xfrm>
-            <a:off x="2971937" y="3174683"/>
-            <a:ext cx="718314" cy="1156621"/>
+            <a:off x="3070240" y="3174683"/>
+            <a:ext cx="620011" cy="1156621"/>
           </a:xfrm>
           <a:prstGeom prst="straightConnector1">
             <a:avLst/>
           </a:prstGeom>
-          <a:ln w="12700">
+          <a:ln w="19050">
             <a:solidFill>
-              <a:schemeClr val="accent2">
-                <a:lumMod val="75000"/>
-              </a:schemeClr>
+              <a:schemeClr val="accent2"/>
             </a:solidFill>
-            <a:prstDash val="dash"/>
+            <a:prstDash val="sysDash"/>
             <a:tailEnd type="triangle"/>
           </a:ln>
         </p:spPr>
@@ -5495,7 +5494,7 @@
         </p:nvSpPr>
         <p:spPr>
           <a:xfrm>
-            <a:off x="4032644" y="5357731"/>
+            <a:off x="4570988" y="5357731"/>
             <a:ext cx="1503938" cy="461665"/>
           </a:xfrm>
           <a:prstGeom prst="rect">
@@ -5547,7 +5546,7 @@
         </p:nvSpPr>
         <p:spPr>
           <a:xfrm>
-            <a:off x="3607751" y="5805525"/>
+            <a:off x="4146095" y="5805525"/>
             <a:ext cx="2383922" cy="276999"/>
           </a:xfrm>
           <a:prstGeom prst="rect">
@@ -5602,7 +5601,7 @@
         </p:nvSpPr>
         <p:spPr>
           <a:xfrm>
-            <a:off x="8644858" y="5357731"/>
+            <a:off x="8740616" y="5357731"/>
             <a:ext cx="1149675" cy="461665"/>
           </a:xfrm>
           <a:prstGeom prst="rect">
@@ -5654,7 +5653,7 @@
         </p:nvSpPr>
         <p:spPr>
           <a:xfrm>
-            <a:off x="8569385" y="5805525"/>
+            <a:off x="8665143" y="5805525"/>
             <a:ext cx="1365502" cy="276999"/>
           </a:xfrm>
           <a:prstGeom prst="rect">

</xml_diff>